<commit_message>
Updated block diagrams, completed tables.
</commit_message>
<xml_diff>
--- a/Figs/Overall_arch_afaac.pptx
+++ b/Figs/Overall_arch_afaac.pptx
@@ -3933,8 +3933,8 @@
             </p:nvSpPr>
             <p:spPr>
               <a:xfrm>
-                <a:off x="3892729" y="497282"/>
-                <a:ext cx="1552089" cy="438367"/>
+                <a:off x="3892729" y="427601"/>
+                <a:ext cx="1552089" cy="583968"/>
               </a:xfrm>
               <a:prstGeom prst="rect">
                 <a:avLst/>
@@ -4288,8 +4288,8 @@
             </p:nvCxnSpPr>
             <p:spPr>
               <a:xfrm>
-                <a:off x="5444818" y="716463"/>
-                <a:ext cx="438975" cy="0"/>
+                <a:off x="5444817" y="719586"/>
+                <a:ext cx="413473" cy="0"/>
               </a:xfrm>
               <a:prstGeom prst="straightConnector1">
                 <a:avLst/>
@@ -4441,116 +4441,6 @@
               </a:p>
             </p:txBody>
           </p:sp>
-          <p:sp>
-            <p:nvSpPr>
-              <p:cNvPr id="86" name="Rectangle 85"/>
-              <p:cNvSpPr/>
-              <p:nvPr/>
-            </p:nvSpPr>
-            <p:spPr>
-              <a:xfrm>
-                <a:off x="3919705" y="1276882"/>
-                <a:ext cx="1552089" cy="438367"/>
-              </a:xfrm>
-              <a:prstGeom prst="rect">
-                <a:avLst/>
-              </a:prstGeom>
-              <a:solidFill>
-                <a:schemeClr val="bg2">
-                  <a:lumMod val="75000"/>
-                </a:schemeClr>
-              </a:solidFill>
-            </p:spPr>
-            <p:style>
-              <a:lnRef idx="1">
-                <a:schemeClr val="accent1"/>
-              </a:lnRef>
-              <a:fillRef idx="3">
-                <a:schemeClr val="accent1"/>
-              </a:fillRef>
-              <a:effectRef idx="2">
-                <a:schemeClr val="accent1"/>
-              </a:effectRef>
-              <a:fontRef idx="minor">
-                <a:schemeClr val="lt1"/>
-              </a:fontRef>
-            </p:style>
-            <p:txBody>
-              <a:bodyPr rtlCol="0" anchor="ctr"/>
-              <a:lstStyle/>
-              <a:p>
-                <a:pPr algn="ctr"/>
-                <a:r>
-                  <a:rPr lang="en-US" sz="1600" dirty="0" smtClean="0">
-                    <a:solidFill>
-                      <a:schemeClr val="tx1">
-                        <a:lumMod val="65000"/>
-                        <a:lumOff val="35000"/>
-                      </a:schemeClr>
-                    </a:solidFill>
-                  </a:rPr>
-                  <a:t>Flag, Calibrate</a:t>
-                </a:r>
-              </a:p>
-              <a:p>
-                <a:pPr algn="ctr"/>
-                <a:r>
-                  <a:rPr lang="en-US" sz="1600" dirty="0" smtClean="0">
-                    <a:solidFill>
-                      <a:schemeClr val="tx1">
-                        <a:lumMod val="65000"/>
-                        <a:lumOff val="35000"/>
-                      </a:schemeClr>
-                    </a:solidFill>
-                  </a:rPr>
-                  <a:t>Visibilities</a:t>
-                </a:r>
-                <a:endParaRPr lang="en-US" sz="1600" dirty="0">
-                  <a:solidFill>
-                    <a:schemeClr val="tx1">
-                      <a:lumMod val="65000"/>
-                      <a:lumOff val="35000"/>
-                    </a:schemeClr>
-                  </a:solidFill>
-                </a:endParaRPr>
-              </a:p>
-            </p:txBody>
-          </p:sp>
-          <p:cxnSp>
-            <p:nvCxnSpPr>
-              <p:cNvPr id="87" name="Straight Arrow Connector 86"/>
-              <p:cNvCxnSpPr>
-                <a:stCxn id="86" idx="3"/>
-              </p:cNvCxnSpPr>
-              <p:nvPr/>
-            </p:nvCxnSpPr>
-            <p:spPr>
-              <a:xfrm>
-                <a:off x="5471794" y="1496066"/>
-                <a:ext cx="438975" cy="13775"/>
-              </a:xfrm>
-              <a:prstGeom prst="straightConnector1">
-                <a:avLst/>
-              </a:prstGeom>
-              <a:ln>
-                <a:tailEnd type="arrow"/>
-              </a:ln>
-            </p:spPr>
-            <p:style>
-              <a:lnRef idx="2">
-                <a:schemeClr val="accent1"/>
-              </a:lnRef>
-              <a:fillRef idx="0">
-                <a:schemeClr val="accent1"/>
-              </a:fillRef>
-              <a:effectRef idx="1">
-                <a:schemeClr val="accent1"/>
-              </a:effectRef>
-              <a:fontRef idx="minor">
-                <a:schemeClr val="tx1"/>
-              </a:fontRef>
-            </p:style>
-          </p:cxnSp>
           <p:grpSp>
             <p:nvGrpSpPr>
               <p:cNvPr id="93" name="Group 92"/>
@@ -6072,81 +5962,6 @@
                 <a:endParaRPr lang="en-US" dirty="0">
                   <a:solidFill>
                     <a:schemeClr val="tx1"/>
-                  </a:solidFill>
-                </a:endParaRPr>
-              </a:p>
-            </p:txBody>
-          </p:sp>
-          <p:sp>
-            <p:nvSpPr>
-              <p:cNvPr id="133" name="Rectangle 132"/>
-              <p:cNvSpPr/>
-              <p:nvPr/>
-            </p:nvSpPr>
-            <p:spPr>
-              <a:xfrm>
-                <a:off x="3867230" y="2585075"/>
-                <a:ext cx="1552089" cy="438367"/>
-              </a:xfrm>
-              <a:prstGeom prst="rect">
-                <a:avLst/>
-              </a:prstGeom>
-              <a:solidFill>
-                <a:schemeClr val="bg2">
-                  <a:lumMod val="75000"/>
-                </a:schemeClr>
-              </a:solidFill>
-            </p:spPr>
-            <p:style>
-              <a:lnRef idx="1">
-                <a:schemeClr val="accent1"/>
-              </a:lnRef>
-              <a:fillRef idx="3">
-                <a:schemeClr val="accent1"/>
-              </a:fillRef>
-              <a:effectRef idx="2">
-                <a:schemeClr val="accent1"/>
-              </a:effectRef>
-              <a:fontRef idx="minor">
-                <a:schemeClr val="lt1"/>
-              </a:fontRef>
-            </p:style>
-            <p:txBody>
-              <a:bodyPr rtlCol="0" anchor="ctr"/>
-              <a:lstStyle/>
-              <a:p>
-                <a:pPr algn="ctr"/>
-                <a:r>
-                  <a:rPr lang="en-US" sz="1600" dirty="0" smtClean="0">
-                    <a:solidFill>
-                      <a:schemeClr val="tx1">
-                        <a:lumMod val="65000"/>
-                        <a:lumOff val="35000"/>
-                      </a:schemeClr>
-                    </a:solidFill>
-                  </a:rPr>
-                  <a:t>Flag, Calibrate</a:t>
-                </a:r>
-              </a:p>
-              <a:p>
-                <a:pPr algn="ctr"/>
-                <a:r>
-                  <a:rPr lang="en-US" sz="1600" dirty="0" smtClean="0">
-                    <a:solidFill>
-                      <a:schemeClr val="tx1">
-                        <a:lumMod val="65000"/>
-                        <a:lumOff val="35000"/>
-                      </a:schemeClr>
-                    </a:solidFill>
-                  </a:rPr>
-                  <a:t>Visibilities</a:t>
-                </a:r>
-                <a:endParaRPr lang="en-US" sz="1600" dirty="0">
-                  <a:solidFill>
-                    <a:schemeClr val="tx1">
-                      <a:lumMod val="65000"/>
-                      <a:lumOff val="35000"/>
-                    </a:schemeClr>
                   </a:solidFill>
                 </a:endParaRPr>
               </a:p>
@@ -6348,41 +6163,6 @@
               </a:fontRef>
             </p:style>
           </p:cxnSp>
-          <p:cxnSp>
-            <p:nvCxnSpPr>
-              <p:cNvPr id="137" name="Straight Arrow Connector 136"/>
-              <p:cNvCxnSpPr>
-                <a:stCxn id="133" idx="3"/>
-              </p:cNvCxnSpPr>
-              <p:nvPr/>
-            </p:nvCxnSpPr>
-            <p:spPr>
-              <a:xfrm>
-                <a:off x="5419319" y="2804256"/>
-                <a:ext cx="438975" cy="0"/>
-              </a:xfrm>
-              <a:prstGeom prst="straightConnector1">
-                <a:avLst/>
-              </a:prstGeom>
-              <a:ln>
-                <a:tailEnd type="arrow"/>
-              </a:ln>
-            </p:spPr>
-            <p:style>
-              <a:lnRef idx="2">
-                <a:schemeClr val="accent1"/>
-              </a:lnRef>
-              <a:fillRef idx="0">
-                <a:schemeClr val="accent1"/>
-              </a:fillRef>
-              <a:effectRef idx="1">
-                <a:schemeClr val="accent1"/>
-              </a:effectRef>
-              <a:fontRef idx="minor">
-                <a:schemeClr val="tx1"/>
-              </a:fontRef>
-            </p:style>
-          </p:cxnSp>
           <p:sp>
             <p:nvSpPr>
               <p:cNvPr id="138" name="Right Arrow 137"/>
@@ -6435,123 +6215,13 @@
           </p:sp>
           <p:sp>
             <p:nvSpPr>
-              <p:cNvPr id="139" name="Rectangle 138"/>
-              <p:cNvSpPr/>
-              <p:nvPr/>
-            </p:nvSpPr>
-            <p:spPr>
-              <a:xfrm>
-                <a:off x="3894205" y="3364673"/>
-                <a:ext cx="1552089" cy="438367"/>
-              </a:xfrm>
-              <a:prstGeom prst="rect">
-                <a:avLst/>
-              </a:prstGeom>
-              <a:solidFill>
-                <a:schemeClr val="bg2">
-                  <a:lumMod val="75000"/>
-                </a:schemeClr>
-              </a:solidFill>
-            </p:spPr>
-            <p:style>
-              <a:lnRef idx="1">
-                <a:schemeClr val="accent1"/>
-              </a:lnRef>
-              <a:fillRef idx="3">
-                <a:schemeClr val="accent1"/>
-              </a:fillRef>
-              <a:effectRef idx="2">
-                <a:schemeClr val="accent1"/>
-              </a:effectRef>
-              <a:fontRef idx="minor">
-                <a:schemeClr val="lt1"/>
-              </a:fontRef>
-            </p:style>
-            <p:txBody>
-              <a:bodyPr rtlCol="0" anchor="ctr"/>
-              <a:lstStyle/>
-              <a:p>
-                <a:pPr algn="ctr"/>
-                <a:r>
-                  <a:rPr lang="en-US" sz="1600" dirty="0" smtClean="0">
-                    <a:solidFill>
-                      <a:schemeClr val="tx1">
-                        <a:lumMod val="65000"/>
-                        <a:lumOff val="35000"/>
-                      </a:schemeClr>
-                    </a:solidFill>
-                  </a:rPr>
-                  <a:t>Flag, Calibrate</a:t>
-                </a:r>
-              </a:p>
-              <a:p>
-                <a:pPr algn="ctr"/>
-                <a:r>
-                  <a:rPr lang="en-US" sz="1600" dirty="0" smtClean="0">
-                    <a:solidFill>
-                      <a:schemeClr val="tx1">
-                        <a:lumMod val="65000"/>
-                        <a:lumOff val="35000"/>
-                      </a:schemeClr>
-                    </a:solidFill>
-                  </a:rPr>
-                  <a:t>Visibilities</a:t>
-                </a:r>
-                <a:endParaRPr lang="en-US" sz="1600" dirty="0">
-                  <a:solidFill>
-                    <a:schemeClr val="tx1">
-                      <a:lumMod val="65000"/>
-                      <a:lumOff val="35000"/>
-                    </a:schemeClr>
-                  </a:solidFill>
-                </a:endParaRPr>
-              </a:p>
-            </p:txBody>
-          </p:sp>
-          <p:cxnSp>
-            <p:nvCxnSpPr>
-              <p:cNvPr id="140" name="Straight Arrow Connector 139"/>
-              <p:cNvCxnSpPr>
-                <a:stCxn id="139" idx="3"/>
-              </p:cNvCxnSpPr>
-              <p:nvPr/>
-            </p:nvCxnSpPr>
-            <p:spPr>
-              <a:xfrm>
-                <a:off x="5446295" y="3583856"/>
-                <a:ext cx="438975" cy="13775"/>
-              </a:xfrm>
-              <a:prstGeom prst="straightConnector1">
-                <a:avLst/>
-              </a:prstGeom>
-              <a:ln>
-                <a:tailEnd type="arrow"/>
-              </a:ln>
-            </p:spPr>
-            <p:style>
-              <a:lnRef idx="2">
-                <a:schemeClr val="accent1"/>
-              </a:lnRef>
-              <a:fillRef idx="0">
-                <a:schemeClr val="accent1"/>
-              </a:fillRef>
-              <a:effectRef idx="1">
-                <a:schemeClr val="accent1"/>
-              </a:effectRef>
-              <a:fontRef idx="minor">
-                <a:schemeClr val="tx1"/>
-              </a:fontRef>
-            </p:style>
-          </p:cxnSp>
-          <p:sp>
-            <p:nvSpPr>
               <p:cNvPr id="141" name="TextBox 140"/>
               <p:cNvSpPr txBox="1"/>
               <p:nvPr/>
             </p:nvSpPr>
             <p:spPr>
               <a:xfrm>
-                <a:off x="5399258" y="2490760"/>
+                <a:off x="5382916" y="2446153"/>
                 <a:ext cx="483014" cy="431100"/>
               </a:xfrm>
               <a:prstGeom prst="rect">
@@ -7093,59 +6763,14 @@
             <p:nvCxnSpPr>
               <p:cNvPr id="195" name="Elbow Connector 194"/>
               <p:cNvCxnSpPr>
-                <a:stCxn id="178" idx="3"/>
                 <a:endCxn id="84" idx="2"/>
               </p:cNvCxnSpPr>
               <p:nvPr/>
             </p:nvCxnSpPr>
             <p:spPr>
-              <a:xfrm flipH="1" flipV="1">
-                <a:off x="8285245" y="3493870"/>
-                <a:ext cx="215920" cy="986037"/>
-              </a:xfrm>
-              <a:prstGeom prst="bentConnector4">
-                <a:avLst>
-                  <a:gd name="adj1" fmla="val -105873"/>
-                  <a:gd name="adj2" fmla="val 63408"/>
-                </a:avLst>
-              </a:prstGeom>
-              <a:ln>
-                <a:solidFill>
-                  <a:schemeClr val="accent3">
-                    <a:lumMod val="75000"/>
-                  </a:schemeClr>
-                </a:solidFill>
-                <a:tailEnd type="arrow"/>
-              </a:ln>
-            </p:spPr>
-            <p:style>
-              <a:lnRef idx="2">
-                <a:schemeClr val="accent1"/>
-              </a:lnRef>
-              <a:fillRef idx="0">
-                <a:schemeClr val="accent1"/>
-              </a:fillRef>
-              <a:effectRef idx="1">
-                <a:schemeClr val="accent1"/>
-              </a:effectRef>
-              <a:fontRef idx="minor">
-                <a:schemeClr val="tx1"/>
-              </a:fontRef>
-            </p:style>
-          </p:cxnSp>
-          <p:cxnSp>
-            <p:nvCxnSpPr>
-              <p:cNvPr id="196" name="Elbow Connector 195"/>
-              <p:cNvCxnSpPr>
-                <a:stCxn id="178" idx="0"/>
-                <a:endCxn id="135" idx="2"/>
-              </p:cNvCxnSpPr>
-              <p:nvPr/>
-            </p:nvCxnSpPr>
-            <p:spPr>
-              <a:xfrm rot="5400000" flipH="1" flipV="1">
-                <a:off x="6144738" y="3874837"/>
-                <a:ext cx="309417" cy="371906"/>
+              <a:xfrm rot="16200000" flipV="1">
+                <a:off x="7924431" y="3854682"/>
+                <a:ext cx="721631" cy="1"/>
               </a:xfrm>
               <a:prstGeom prst="bentConnector3">
                 <a:avLst>
@@ -7178,16 +6803,16 @@
           </p:cxnSp>
           <p:cxnSp>
             <p:nvCxnSpPr>
-              <p:cNvPr id="200" name="Elbow Connector 199"/>
+              <p:cNvPr id="196" name="Elbow Connector 195"/>
               <p:cNvCxnSpPr>
-                <a:endCxn id="139" idx="2"/>
+                <a:endCxn id="135" idx="2"/>
               </p:cNvCxnSpPr>
               <p:nvPr/>
             </p:nvCxnSpPr>
             <p:spPr>
               <a:xfrm rot="16200000" flipV="1">
-                <a:off x="4464023" y="4009269"/>
-                <a:ext cx="418808" cy="6353"/>
+                <a:off x="6327515" y="4063964"/>
+                <a:ext cx="315769" cy="2"/>
               </a:xfrm>
               <a:prstGeom prst="bentConnector3">
                 <a:avLst>
@@ -8178,6 +7803,376 @@
           </p:cxnSp>
         </p:grpSp>
       </p:grpSp>
+      <p:sp>
+        <p:nvSpPr>
+          <p:cNvPr id="304" name="Rectangle 303"/>
+          <p:cNvSpPr/>
+          <p:nvPr/>
+        </p:nvSpPr>
+        <p:spPr>
+          <a:xfrm>
+            <a:off x="4153977" y="2360053"/>
+            <a:ext cx="1474575" cy="527735"/>
+          </a:xfrm>
+          <a:prstGeom prst="rect">
+            <a:avLst/>
+          </a:prstGeom>
+          <a:solidFill>
+            <a:schemeClr val="bg2">
+              <a:lumMod val="75000"/>
+            </a:schemeClr>
+          </a:solidFill>
+        </p:spPr>
+        <p:style>
+          <a:lnRef idx="1">
+            <a:schemeClr val="accent1"/>
+          </a:lnRef>
+          <a:fillRef idx="3">
+            <a:schemeClr val="accent1"/>
+          </a:fillRef>
+          <a:effectRef idx="2">
+            <a:schemeClr val="accent1"/>
+          </a:effectRef>
+          <a:fontRef idx="minor">
+            <a:schemeClr val="lt1"/>
+          </a:fontRef>
+        </p:style>
+        <p:txBody>
+          <a:bodyPr rtlCol="0" anchor="ctr"/>
+          <a:lstStyle/>
+          <a:p>
+            <a:pPr algn="ctr"/>
+            <a:r>
+              <a:rPr lang="en-US" sz="1600" dirty="0" smtClean="0">
+                <a:solidFill>
+                  <a:schemeClr val="tx1">
+                    <a:lumMod val="65000"/>
+                    <a:lumOff val="35000"/>
+                  </a:schemeClr>
+                </a:solidFill>
+              </a:rPr>
+              <a:t>Flag, Calibrate</a:t>
+            </a:r>
+          </a:p>
+          <a:p>
+            <a:pPr algn="ctr"/>
+            <a:r>
+              <a:rPr lang="en-US" sz="1600" dirty="0" smtClean="0">
+                <a:solidFill>
+                  <a:schemeClr val="tx1">
+                    <a:lumMod val="65000"/>
+                    <a:lumOff val="35000"/>
+                  </a:schemeClr>
+                </a:solidFill>
+              </a:rPr>
+              <a:t>Visibilities</a:t>
+            </a:r>
+            <a:endParaRPr lang="en-US" sz="1600" dirty="0">
+              <a:solidFill>
+                <a:schemeClr val="tx1">
+                  <a:lumMod val="65000"/>
+                  <a:lumOff val="35000"/>
+                </a:schemeClr>
+              </a:solidFill>
+            </a:endParaRPr>
+          </a:p>
+        </p:txBody>
+      </p:sp>
+      <p:cxnSp>
+        <p:nvCxnSpPr>
+          <p:cNvPr id="305" name="Straight Arrow Connector 304"/>
+          <p:cNvCxnSpPr>
+            <a:stCxn id="304" idx="3"/>
+          </p:cNvCxnSpPr>
+          <p:nvPr/>
+        </p:nvCxnSpPr>
+        <p:spPr>
+          <a:xfrm>
+            <a:off x="5628552" y="2623921"/>
+            <a:ext cx="392824" cy="0"/>
+          </a:xfrm>
+          <a:prstGeom prst="straightConnector1">
+            <a:avLst/>
+          </a:prstGeom>
+          <a:ln>
+            <a:tailEnd type="arrow"/>
+          </a:ln>
+        </p:spPr>
+        <p:style>
+          <a:lnRef idx="2">
+            <a:schemeClr val="accent1"/>
+          </a:lnRef>
+          <a:fillRef idx="0">
+            <a:schemeClr val="accent1"/>
+          </a:fillRef>
+          <a:effectRef idx="1">
+            <a:schemeClr val="accent1"/>
+          </a:effectRef>
+          <a:fontRef idx="minor">
+            <a:schemeClr val="tx1"/>
+          </a:fontRef>
+        </p:style>
+      </p:cxnSp>
+      <p:sp>
+        <p:nvSpPr>
+          <p:cNvPr id="306" name="Rectangle 305"/>
+          <p:cNvSpPr/>
+          <p:nvPr/>
+        </p:nvSpPr>
+        <p:spPr>
+          <a:xfrm>
+            <a:off x="4157451" y="3077548"/>
+            <a:ext cx="1474575" cy="527735"/>
+          </a:xfrm>
+          <a:prstGeom prst="rect">
+            <a:avLst/>
+          </a:prstGeom>
+          <a:solidFill>
+            <a:schemeClr val="bg2">
+              <a:lumMod val="75000"/>
+            </a:schemeClr>
+          </a:solidFill>
+        </p:spPr>
+        <p:style>
+          <a:lnRef idx="1">
+            <a:schemeClr val="accent1"/>
+          </a:lnRef>
+          <a:fillRef idx="3">
+            <a:schemeClr val="accent1"/>
+          </a:fillRef>
+          <a:effectRef idx="2">
+            <a:schemeClr val="accent1"/>
+          </a:effectRef>
+          <a:fontRef idx="minor">
+            <a:schemeClr val="lt1"/>
+          </a:fontRef>
+        </p:style>
+        <p:txBody>
+          <a:bodyPr rtlCol="0" anchor="ctr"/>
+          <a:lstStyle/>
+          <a:p>
+            <a:pPr algn="ctr"/>
+            <a:r>
+              <a:rPr lang="en-US" sz="1600" dirty="0" smtClean="0">
+                <a:solidFill>
+                  <a:schemeClr val="tx1">
+                    <a:lumMod val="65000"/>
+                    <a:lumOff val="35000"/>
+                  </a:schemeClr>
+                </a:solidFill>
+              </a:rPr>
+              <a:t>Flag, Calibrate</a:t>
+            </a:r>
+          </a:p>
+          <a:p>
+            <a:pPr algn="ctr"/>
+            <a:r>
+              <a:rPr lang="en-US" sz="1600" dirty="0" smtClean="0">
+                <a:solidFill>
+                  <a:schemeClr val="tx1">
+                    <a:lumMod val="65000"/>
+                    <a:lumOff val="35000"/>
+                  </a:schemeClr>
+                </a:solidFill>
+              </a:rPr>
+              <a:t>Visibilities</a:t>
+            </a:r>
+            <a:endParaRPr lang="en-US" sz="1600" dirty="0">
+              <a:solidFill>
+                <a:schemeClr val="tx1">
+                  <a:lumMod val="65000"/>
+                  <a:lumOff val="35000"/>
+                </a:schemeClr>
+              </a:solidFill>
+            </a:endParaRPr>
+          </a:p>
+        </p:txBody>
+      </p:sp>
+      <p:cxnSp>
+        <p:nvCxnSpPr>
+          <p:cNvPr id="307" name="Straight Arrow Connector 306"/>
+          <p:cNvCxnSpPr>
+            <a:stCxn id="306" idx="3"/>
+          </p:cNvCxnSpPr>
+          <p:nvPr/>
+        </p:nvCxnSpPr>
+        <p:spPr>
+          <a:xfrm>
+            <a:off x="5632026" y="3341416"/>
+            <a:ext cx="392824" cy="0"/>
+          </a:xfrm>
+          <a:prstGeom prst="straightConnector1">
+            <a:avLst/>
+          </a:prstGeom>
+          <a:ln>
+            <a:tailEnd type="arrow"/>
+          </a:ln>
+        </p:spPr>
+        <p:style>
+          <a:lnRef idx="2">
+            <a:schemeClr val="accent1"/>
+          </a:lnRef>
+          <a:fillRef idx="0">
+            <a:schemeClr val="accent1"/>
+          </a:fillRef>
+          <a:effectRef idx="1">
+            <a:schemeClr val="accent1"/>
+          </a:effectRef>
+          <a:fontRef idx="minor">
+            <a:schemeClr val="tx1"/>
+          </a:fontRef>
+        </p:style>
+      </p:cxnSp>
+      <p:sp>
+        <p:nvSpPr>
+          <p:cNvPr id="308" name="Rectangle 307"/>
+          <p:cNvSpPr/>
+          <p:nvPr/>
+        </p:nvSpPr>
+        <p:spPr>
+          <a:xfrm>
+            <a:off x="4162684" y="1187880"/>
+            <a:ext cx="1474575" cy="527735"/>
+          </a:xfrm>
+          <a:prstGeom prst="rect">
+            <a:avLst/>
+          </a:prstGeom>
+          <a:solidFill>
+            <a:schemeClr val="bg2">
+              <a:lumMod val="75000"/>
+            </a:schemeClr>
+          </a:solidFill>
+        </p:spPr>
+        <p:style>
+          <a:lnRef idx="1">
+            <a:schemeClr val="accent1"/>
+          </a:lnRef>
+          <a:fillRef idx="3">
+            <a:schemeClr val="accent1"/>
+          </a:fillRef>
+          <a:effectRef idx="2">
+            <a:schemeClr val="accent1"/>
+          </a:effectRef>
+          <a:fontRef idx="minor">
+            <a:schemeClr val="lt1"/>
+          </a:fontRef>
+        </p:style>
+        <p:txBody>
+          <a:bodyPr rtlCol="0" anchor="ctr"/>
+          <a:lstStyle/>
+          <a:p>
+            <a:pPr algn="ctr"/>
+            <a:r>
+              <a:rPr lang="en-US" sz="1600" dirty="0" smtClean="0">
+                <a:solidFill>
+                  <a:schemeClr val="tx1">
+                    <a:lumMod val="65000"/>
+                    <a:lumOff val="35000"/>
+                  </a:schemeClr>
+                </a:solidFill>
+              </a:rPr>
+              <a:t>Flag, Calibrate</a:t>
+            </a:r>
+          </a:p>
+          <a:p>
+            <a:pPr algn="ctr"/>
+            <a:r>
+              <a:rPr lang="en-US" sz="1600" dirty="0" smtClean="0">
+                <a:solidFill>
+                  <a:schemeClr val="tx1">
+                    <a:lumMod val="65000"/>
+                    <a:lumOff val="35000"/>
+                  </a:schemeClr>
+                </a:solidFill>
+              </a:rPr>
+              <a:t>Visibilities</a:t>
+            </a:r>
+            <a:endParaRPr lang="en-US" sz="1600" dirty="0">
+              <a:solidFill>
+                <a:schemeClr val="tx1">
+                  <a:lumMod val="65000"/>
+                  <a:lumOff val="35000"/>
+                </a:schemeClr>
+              </a:solidFill>
+            </a:endParaRPr>
+          </a:p>
+        </p:txBody>
+      </p:sp>
+      <p:cxnSp>
+        <p:nvCxnSpPr>
+          <p:cNvPr id="309" name="Straight Arrow Connector 308"/>
+          <p:cNvCxnSpPr>
+            <a:stCxn id="308" idx="3"/>
+          </p:cNvCxnSpPr>
+          <p:nvPr/>
+        </p:nvCxnSpPr>
+        <p:spPr>
+          <a:xfrm>
+            <a:off x="5637259" y="1451748"/>
+            <a:ext cx="392824" cy="0"/>
+          </a:xfrm>
+          <a:prstGeom prst="straightConnector1">
+            <a:avLst/>
+          </a:prstGeom>
+          <a:ln>
+            <a:tailEnd type="arrow"/>
+          </a:ln>
+        </p:spPr>
+        <p:style>
+          <a:lnRef idx="2">
+            <a:schemeClr val="accent1"/>
+          </a:lnRef>
+          <a:fillRef idx="0">
+            <a:schemeClr val="accent1"/>
+          </a:fillRef>
+          <a:effectRef idx="1">
+            <a:schemeClr val="accent1"/>
+          </a:effectRef>
+          <a:fontRef idx="minor">
+            <a:schemeClr val="tx1"/>
+          </a:fontRef>
+        </p:style>
+      </p:cxnSp>
+      <p:cxnSp>
+        <p:nvCxnSpPr>
+          <p:cNvPr id="315" name="Elbow Connector 314"/>
+          <p:cNvCxnSpPr/>
+          <p:nvPr/>
+        </p:nvCxnSpPr>
+        <p:spPr>
+          <a:xfrm rot="16200000" flipV="1">
+            <a:off x="4721153" y="3759705"/>
+            <a:ext cx="285362" cy="2"/>
+          </a:xfrm>
+          <a:prstGeom prst="bentConnector3">
+            <a:avLst>
+              <a:gd name="adj1" fmla="val 50000"/>
+            </a:avLst>
+          </a:prstGeom>
+          <a:ln>
+            <a:solidFill>
+              <a:schemeClr val="accent3">
+                <a:lumMod val="75000"/>
+              </a:schemeClr>
+            </a:solidFill>
+            <a:tailEnd type="arrow"/>
+          </a:ln>
+        </p:spPr>
+        <p:style>
+          <a:lnRef idx="2">
+            <a:schemeClr val="accent1"/>
+          </a:lnRef>
+          <a:fillRef idx="0">
+            <a:schemeClr val="accent1"/>
+          </a:fillRef>
+          <a:effectRef idx="1">
+            <a:schemeClr val="accent1"/>
+          </a:effectRef>
+          <a:fontRef idx="minor">
+            <a:schemeClr val="tx1"/>
+          </a:fontRef>
+        </p:style>
+      </p:cxnSp>
     </p:spTree>
     <p:extLst>
       <p:ext uri="{BB962C8B-B14F-4D97-AF65-F5344CB8AC3E}">

</xml_diff>

<commit_message>
Major changes to text, filled out table 2 	modified:   Figs/Overall_arch_afaac.pptx 	modified:   Figs/Overall_arch_afaac/Slide1.png 	modified:   Figs/aartfaac_control_system.pptx 	modified:   Figs/aartfaac_control_system/Slide1.png 	modified:   aartfaac_sys_design_jai.tex 	modified:   ref.bib
</commit_message>
<xml_diff>
--- a/Figs/Overall_arch_afaac.pptx
+++ b/Figs/Overall_arch_afaac.pptx
@@ -6783,6 +6783,7 @@
                     <a:lumMod val="75000"/>
                   </a:schemeClr>
                 </a:solidFill>
+                <a:prstDash val="sysDash"/>
                 <a:tailEnd type="arrow"/>
               </a:ln>
             </p:spPr>
@@ -6825,6 +6826,7 @@
                     <a:lumMod val="75000"/>
                   </a:schemeClr>
                 </a:solidFill>
+                <a:prstDash val="sysDash"/>
                 <a:tailEnd type="arrow"/>
               </a:ln>
             </p:spPr>
@@ -6868,6 +6870,7 @@
                     <a:lumMod val="75000"/>
                   </a:schemeClr>
                 </a:solidFill>
+                <a:prstDash val="sysDash"/>
                 <a:tailEnd type="arrow"/>
               </a:ln>
             </p:spPr>
@@ -6910,6 +6913,7 @@
                     <a:lumMod val="75000"/>
                   </a:schemeClr>
                 </a:solidFill>
+                <a:prstDash val="sysDash"/>
                 <a:tailEnd type="arrow"/>
               </a:ln>
             </p:spPr>
@@ -7202,6 +7206,7 @@
                   <a:lumMod val="75000"/>
                 </a:schemeClr>
               </a:solidFill>
+              <a:prstDash val="sysDash"/>
               <a:tailEnd type="arrow"/>
             </a:ln>
           </p:spPr>
@@ -8155,6 +8160,7 @@
                 <a:lumMod val="75000"/>
               </a:schemeClr>
             </a:solidFill>
+            <a:prstDash val="sysDash"/>
             <a:tailEnd type="arrow"/>
           </a:ln>
         </p:spPr>

</xml_diff>